<commit_message>
Add date and name to slides.
</commit_message>
<xml_diff>
--- a/slides/QLS-MiCM Intro to Python (Part 1) Workshop PPT.pptx
+++ b/slides/QLS-MiCM Intro to Python (Part 1) Workshop PPT.pptx
@@ -18497,7 +18497,7 @@
           <a:p>
             <a:fld id="{9FF74AA5-8A3E-4FDB-94BB-BF4B31CB4E38}" type="datetimeFigureOut">
               <a:rPr lang="en-CA" smtClean="0"/>
-              <a:t>2024-10-21</a:t>
+              <a:t>2024-10-28</a:t>
             </a:fld>
             <a:endParaRPr lang="en-CA"/>
           </a:p>
@@ -18674,7 +18674,7 @@
           <a:p>
             <a:fld id="{217E5156-1B5D-054E-B5B2-E1B1BA160252}" type="datetimeFigureOut">
               <a:rPr lang="fr-FR" smtClean="0"/>
-              <a:t>21/10/2024</a:t>
+              <a:t>28/10/2024</a:t>
             </a:fld>
             <a:endParaRPr lang="fr-FR"/>
           </a:p>
@@ -21336,7 +21336,7 @@
               <a:rPr lang="en-CA" sz="1800" dirty="0">
                 <a:latin typeface="Helvetica Light"/>
               </a:rPr>
-              <a:t>Workshop Lead:</a:t>
+              <a:t>Benjamin Rudski</a:t>
             </a:r>
           </a:p>
           <a:p>
@@ -21344,7 +21344,7 @@
               <a:rPr lang="en-CA" sz="1800" dirty="0">
                 <a:latin typeface="Helvetica Light"/>
               </a:rPr>
-              <a:t>Month Date, Year </a:t>
+              <a:t>October 28, 2024</a:t>
             </a:r>
             <a:endParaRPr lang="en-CA" dirty="0">
               <a:latin typeface="Helvetica Light"/>

</xml_diff>